<commit_message>
Describe how to use Built-in Functions
</commit_message>
<xml_diff>
--- a/docs/how-to-slides/Gtg-Variables.pptx
+++ b/docs/how-to-slides/Gtg-Variables.pptx
@@ -12,6 +12,8 @@
     <p:sldId id="262" r:id="rId6"/>
     <p:sldId id="263" r:id="rId7"/>
     <p:sldId id="259" r:id="rId8"/>
+    <p:sldId id="265" r:id="rId9"/>
+    <p:sldId id="264" r:id="rId10"/>
   </p:sldIdLst>
   <p:sldSz cx="9144000" cy="6858000" type="screen4x3"/>
   <p:notesSz cx="6858000" cy="9144000"/>
@@ -257,7 +259,7 @@
             <a:fld id="{C1027E9F-FA41-416A-9F2C-F465002B321A}" type="datetimeFigureOut">
               <a:rPr lang="ru-RU" smtClean="0"/>
               <a:pPr/>
-              <a:t>10.07.2023</a:t>
+              <a:t>17.08.2023</a:t>
             </a:fld>
             <a:endParaRPr lang="ru-RU"/>
           </a:p>
@@ -618,7 +620,7 @@
             <a:fld id="{C1027E9F-FA41-416A-9F2C-F465002B321A}" type="datetimeFigureOut">
               <a:rPr lang="ru-RU" smtClean="0"/>
               <a:pPr/>
-              <a:t>10.07.2023</a:t>
+              <a:t>17.08.2023</a:t>
             </a:fld>
             <a:endParaRPr lang="ru-RU"/>
           </a:p>
@@ -795,7 +797,7 @@
             <a:fld id="{C1027E9F-FA41-416A-9F2C-F465002B321A}" type="datetimeFigureOut">
               <a:rPr lang="ru-RU" smtClean="0"/>
               <a:pPr/>
-              <a:t>10.07.2023</a:t>
+              <a:t>17.08.2023</a:t>
             </a:fld>
             <a:endParaRPr lang="ru-RU"/>
           </a:p>
@@ -1032,7 +1034,7 @@
             <a:fld id="{C1027E9F-FA41-416A-9F2C-F465002B321A}" type="datetimeFigureOut">
               <a:rPr lang="ru-RU" smtClean="0"/>
               <a:pPr/>
-              <a:t>10.07.2023</a:t>
+              <a:t>17.08.2023</a:t>
             </a:fld>
             <a:endParaRPr lang="ru-RU"/>
           </a:p>
@@ -1303,7 +1305,7 @@
             <a:fld id="{C1027E9F-FA41-416A-9F2C-F465002B321A}" type="datetimeFigureOut">
               <a:rPr lang="ru-RU" smtClean="0"/>
               <a:pPr/>
-              <a:t>10.07.2023</a:t>
+              <a:t>17.08.2023</a:t>
             </a:fld>
             <a:endParaRPr lang="ru-RU"/>
           </a:p>
@@ -1525,7 +1527,7 @@
             <a:fld id="{C1027E9F-FA41-416A-9F2C-F465002B321A}" type="datetimeFigureOut">
               <a:rPr lang="ru-RU" smtClean="0"/>
               <a:pPr/>
-              <a:t>10.07.2023</a:t>
+              <a:t>17.08.2023</a:t>
             </a:fld>
             <a:endParaRPr lang="ru-RU"/>
           </a:p>
@@ -1879,7 +1881,7 @@
             <a:fld id="{C1027E9F-FA41-416A-9F2C-F465002B321A}" type="datetimeFigureOut">
               <a:rPr lang="ru-RU" smtClean="0"/>
               <a:pPr/>
-              <a:t>10.07.2023</a:t>
+              <a:t>17.08.2023</a:t>
             </a:fld>
             <a:endParaRPr lang="ru-RU"/>
           </a:p>
@@ -2113,7 +2115,7 @@
             <a:fld id="{C1027E9F-FA41-416A-9F2C-F465002B321A}" type="datetimeFigureOut">
               <a:rPr lang="ru-RU" smtClean="0"/>
               <a:pPr/>
-              <a:t>10.07.2023</a:t>
+              <a:t>17.08.2023</a:t>
             </a:fld>
             <a:endParaRPr lang="ru-RU"/>
           </a:p>
@@ -2255,7 +2257,7 @@
             <a:fld id="{C1027E9F-FA41-416A-9F2C-F465002B321A}" type="datetimeFigureOut">
               <a:rPr lang="ru-RU" smtClean="0"/>
               <a:pPr/>
-              <a:t>10.07.2023</a:t>
+              <a:t>17.08.2023</a:t>
             </a:fld>
             <a:endParaRPr lang="ru-RU"/>
           </a:p>
@@ -2534,7 +2536,7 @@
             <a:fld id="{C1027E9F-FA41-416A-9F2C-F465002B321A}" type="datetimeFigureOut">
               <a:rPr lang="ru-RU" smtClean="0"/>
               <a:pPr/>
-              <a:t>10.07.2023</a:t>
+              <a:t>17.08.2023</a:t>
             </a:fld>
             <a:endParaRPr lang="ru-RU"/>
           </a:p>
@@ -2943,7 +2945,7 @@
             <a:fld id="{C1027E9F-FA41-416A-9F2C-F465002B321A}" type="datetimeFigureOut">
               <a:rPr lang="ru-RU" smtClean="0"/>
               <a:pPr/>
-              <a:t>10.07.2023</a:t>
+              <a:t>17.08.2023</a:t>
             </a:fld>
             <a:endParaRPr lang="ru-RU"/>
           </a:p>
@@ -3283,7 +3285,7 @@
             <a:fld id="{C1027E9F-FA41-416A-9F2C-F465002B321A}" type="datetimeFigureOut">
               <a:rPr lang="ru-RU" smtClean="0"/>
               <a:pPr/>
-              <a:t>10.07.2023</a:t>
+              <a:t>17.08.2023</a:t>
             </a:fld>
             <a:endParaRPr lang="ru-RU"/>
           </a:p>
@@ -5055,6 +5057,1348 @@
 </file>
 
 <file path=ppt/slides/slide7.xml><?xml version="1.0" encoding="utf-8"?>
+<p:sld xmlns:a="http://schemas.openxmlformats.org/drawingml/2006/main" xmlns:r="http://schemas.openxmlformats.org/officeDocument/2006/relationships" xmlns:p="http://schemas.openxmlformats.org/presentationml/2006/main">
+  <p:cSld>
+    <p:bg>
+      <p:bgPr>
+        <a:noFill/>
+        <a:effectLst/>
+      </p:bgPr>
+    </p:bg>
+    <p:spTree>
+      <p:nvGrpSpPr>
+        <p:cNvPr id="1" name=""/>
+        <p:cNvGrpSpPr/>
+        <p:nvPr/>
+      </p:nvGrpSpPr>
+      <p:grpSpPr>
+        <a:xfrm>
+          <a:off x="0" y="0"/>
+          <a:ext cx="0" cy="0"/>
+          <a:chOff x="0" y="0"/>
+          <a:chExt cx="0" cy="0"/>
+        </a:xfrm>
+      </p:grpSpPr>
+      <p:sp>
+        <p:nvSpPr>
+          <p:cNvPr id="2" name="Заголовок 1"/>
+          <p:cNvSpPr>
+            <a:spLocks noGrp="1"/>
+          </p:cNvSpPr>
+          <p:nvPr>
+            <p:ph type="title"/>
+          </p:nvPr>
+        </p:nvSpPr>
+        <p:spPr/>
+        <p:txBody>
+          <a:bodyPr/>
+          <a:lstStyle/>
+          <a:p>
+            <a:r>
+              <a:rPr lang="ru-RU" dirty="0" smtClean="0"/>
+              <a:t>Встроенные функции</a:t>
+            </a:r>
+            <a:endParaRPr lang="ru-RU" dirty="0"/>
+          </a:p>
+        </p:txBody>
+      </p:sp>
+      <p:sp>
+        <p:nvSpPr>
+          <p:cNvPr id="4" name="TextBox 3"/>
+          <p:cNvSpPr txBox="1"/>
+          <p:nvPr/>
+        </p:nvSpPr>
+        <p:spPr>
+          <a:xfrm>
+            <a:off x="571472" y="1214422"/>
+            <a:ext cx="7737503" cy="646331"/>
+          </a:xfrm>
+          <a:prstGeom prst="rect">
+            <a:avLst/>
+          </a:prstGeom>
+          <a:noFill/>
+        </p:spPr>
+        <p:txBody>
+          <a:bodyPr wrap="none" rtlCol="0">
+            <a:spAutoFit/>
+          </a:bodyPr>
+          <a:lstStyle/>
+          <a:p>
+            <a:r>
+              <a:rPr lang="en-US" dirty="0" smtClean="0">
+                <a:hlinkClick r:id="rId2"/>
+              </a:rPr>
+              <a:t>https://gatling.io/docs/gatling/reference/current/core/session/el/#</a:t>
+            </a:r>
+            <a:r>
+              <a:rPr lang="en-US" dirty="0" smtClean="0">
+                <a:hlinkClick r:id="rId2"/>
+              </a:rPr>
+              <a:t>built-in-functions</a:t>
+            </a:r>
+            <a:endParaRPr lang="ru-RU" dirty="0" smtClean="0"/>
+          </a:p>
+          <a:p>
+            <a:endParaRPr lang="ru-RU" dirty="0"/>
+          </a:p>
+        </p:txBody>
+      </p:sp>
+      <p:pic>
+        <p:nvPicPr>
+          <p:cNvPr id="1026" name="Picture 2"/>
+          <p:cNvPicPr>
+            <a:picLocks noChangeAspect="1" noChangeArrowheads="1"/>
+          </p:cNvPicPr>
+          <p:nvPr/>
+        </p:nvPicPr>
+        <p:blipFill>
+          <a:blip r:embed="rId3"/>
+          <a:srcRect/>
+          <a:stretch>
+            <a:fillRect/>
+          </a:stretch>
+        </p:blipFill>
+        <p:spPr bwMode="auto">
+          <a:xfrm>
+            <a:off x="785786" y="1714488"/>
+            <a:ext cx="7543823" cy="4703089"/>
+          </a:xfrm>
+          <a:prstGeom prst="rect">
+            <a:avLst/>
+          </a:prstGeom>
+          <a:noFill/>
+          <a:ln w="9525">
+            <a:noFill/>
+            <a:miter lim="800000"/>
+            <a:headEnd/>
+            <a:tailEnd/>
+          </a:ln>
+          <a:effectLst/>
+        </p:spPr>
+      </p:pic>
+      <p:sp>
+        <p:nvSpPr>
+          <p:cNvPr id="1027" name="Rectangle 3"/>
+          <p:cNvSpPr>
+            <a:spLocks noChangeArrowheads="1"/>
+          </p:cNvSpPr>
+          <p:nvPr/>
+        </p:nvSpPr>
+        <p:spPr bwMode="auto">
+          <a:xfrm>
+            <a:off x="0" y="0"/>
+            <a:ext cx="9144000" cy="457200"/>
+          </a:xfrm>
+          <a:prstGeom prst="rect">
+            <a:avLst/>
+          </a:prstGeom>
+          <a:solidFill>
+            <a:srgbClr val="FAFAFA"/>
+          </a:solidFill>
+          <a:ln w="9525">
+            <a:noFill/>
+            <a:miter lim="800000"/>
+            <a:headEnd/>
+            <a:tailEnd/>
+          </a:ln>
+          <a:effectLst/>
+        </p:spPr>
+        <p:txBody>
+          <a:bodyPr vert="horz" wrap="none" lIns="91440" tIns="45720" rIns="91440" bIns="45720" numCol="1" anchor="ctr" anchorCtr="0" compatLnSpc="1">
+            <a:prstTxWarp prst="textNoShape">
+              <a:avLst/>
+            </a:prstTxWarp>
+            <a:spAutoFit/>
+          </a:bodyPr>
+          <a:lstStyle/>
+          <a:p>
+            <a:pPr marL="0" marR="0" lvl="0" indent="0" algn="l" defTabSz="914400" rtl="0" eaLnBrk="1" fontAlgn="base" latinLnBrk="0" hangingPunct="1">
+              <a:lnSpc>
+                <a:spcPct val="100000"/>
+              </a:lnSpc>
+              <a:spcBef>
+                <a:spcPct val="0"/>
+              </a:spcBef>
+              <a:spcAft>
+                <a:spcPct val="0"/>
+              </a:spcAft>
+              <a:buClrTx/>
+              <a:buSzTx/>
+              <a:buFontTx/>
+              <a:buNone/>
+              <a:tabLst/>
+            </a:pPr>
+            <a:r>
+              <a:rPr kumimoji="0" lang="ru-RU" sz="1000" b="0" i="0" u="none" strike="noStrike" cap="none" normalizeH="0" baseline="0" smtClean="0">
+                <a:ln>
+                  <a:noFill/>
+                </a:ln>
+                <a:solidFill>
+                  <a:srgbClr val="75715E"/>
+                </a:solidFill>
+                <a:effectLst/>
+                <a:latin typeface="sfmono-regular"/>
+                <a:cs typeface="Arial" pitchFamily="34" charset="0"/>
+              </a:rPr>
+              <a:t>// collection size // supports arrays, Java Collection, Java Map, Scala Iterable and Product </a:t>
+            </a:r>
+            <a:r>
+              <a:rPr kumimoji="0" lang="ru-RU" sz="1000" b="0" i="0" u="none" strike="noStrike" cap="none" normalizeH="0" baseline="0" smtClean="0">
+                <a:ln>
+                  <a:noFill/>
+                </a:ln>
+                <a:solidFill>
+                  <a:srgbClr val="F78557"/>
+                </a:solidFill>
+                <a:effectLst/>
+                <a:latin typeface="sfmono-regular"/>
+                <a:cs typeface="Arial" pitchFamily="34" charset="0"/>
+              </a:rPr>
+              <a:t>"#{foo.size()}"</a:t>
+            </a:r>
+            <a:r>
+              <a:rPr kumimoji="0" lang="ru-RU" sz="1000" b="0" i="0" u="none" strike="noStrike" cap="none" normalizeH="0" baseline="0" smtClean="0">
+                <a:ln>
+                  <a:noFill/>
+                </a:ln>
+                <a:solidFill>
+                  <a:srgbClr val="272822"/>
+                </a:solidFill>
+                <a:effectLst/>
+                <a:latin typeface="sfmono-regular"/>
+                <a:cs typeface="Arial" pitchFamily="34" charset="0"/>
+              </a:rPr>
+              <a:t> </a:t>
+            </a:r>
+            <a:r>
+              <a:rPr kumimoji="0" lang="ru-RU" sz="1000" b="0" i="0" u="none" strike="noStrike" cap="none" normalizeH="0" baseline="0" smtClean="0">
+                <a:ln>
+                  <a:noFill/>
+                </a:ln>
+                <a:solidFill>
+                  <a:srgbClr val="75715E"/>
+                </a:solidFill>
+                <a:effectLst/>
+                <a:latin typeface="sfmono-regular"/>
+                <a:cs typeface="Arial" pitchFamily="34" charset="0"/>
+              </a:rPr>
+              <a:t>// collection random element // supports arrays, Java Collection, Java List, Scala Seq and Product </a:t>
+            </a:r>
+            <a:r>
+              <a:rPr kumimoji="0" lang="ru-RU" sz="1000" b="0" i="0" u="none" strike="noStrike" cap="none" normalizeH="0" baseline="0" smtClean="0">
+                <a:ln>
+                  <a:noFill/>
+                </a:ln>
+                <a:solidFill>
+                  <a:srgbClr val="F78557"/>
+                </a:solidFill>
+                <a:effectLst/>
+                <a:latin typeface="sfmono-regular"/>
+                <a:cs typeface="Arial" pitchFamily="34" charset="0"/>
+              </a:rPr>
+              <a:t>"#{foo.random()}"</a:t>
+            </a:r>
+            <a:r>
+              <a:rPr kumimoji="0" lang="ru-RU" sz="1000" b="0" i="0" u="none" strike="noStrike" cap="none" normalizeH="0" baseline="0" smtClean="0">
+                <a:ln>
+                  <a:noFill/>
+                </a:ln>
+                <a:solidFill>
+                  <a:srgbClr val="272822"/>
+                </a:solidFill>
+                <a:effectLst/>
+                <a:latin typeface="sfmono-regular"/>
+                <a:cs typeface="Arial" pitchFamily="34" charset="0"/>
+              </a:rPr>
+              <a:t> </a:t>
+            </a:r>
+            <a:r>
+              <a:rPr kumimoji="0" lang="ru-RU" sz="1000" b="0" i="0" u="none" strike="noStrike" cap="none" normalizeH="0" baseline="0" smtClean="0">
+                <a:ln>
+                  <a:noFill/>
+                </a:ln>
+                <a:solidFill>
+                  <a:srgbClr val="75715E"/>
+                </a:solidFill>
+                <a:effectLst/>
+                <a:latin typeface="sfmono-regular"/>
+                <a:cs typeface="Arial" pitchFamily="34" charset="0"/>
+              </a:rPr>
+              <a:t>// true if the session contains a `foo` attribute </a:t>
+            </a:r>
+            <a:r>
+              <a:rPr kumimoji="0" lang="ru-RU" sz="1000" b="0" i="0" u="none" strike="noStrike" cap="none" normalizeH="0" baseline="0" smtClean="0">
+                <a:ln>
+                  <a:noFill/>
+                </a:ln>
+                <a:solidFill>
+                  <a:srgbClr val="F78557"/>
+                </a:solidFill>
+                <a:effectLst/>
+                <a:latin typeface="sfmono-regular"/>
+                <a:cs typeface="Arial" pitchFamily="34" charset="0"/>
+              </a:rPr>
+              <a:t>"#{foo.exists()}"</a:t>
+            </a:r>
+            <a:r>
+              <a:rPr kumimoji="0" lang="ru-RU" sz="1000" b="0" i="0" u="none" strike="noStrike" cap="none" normalizeH="0" baseline="0" smtClean="0">
+                <a:ln>
+                  <a:noFill/>
+                </a:ln>
+                <a:solidFill>
+                  <a:srgbClr val="272822"/>
+                </a:solidFill>
+                <a:effectLst/>
+                <a:latin typeface="sfmono-regular"/>
+                <a:cs typeface="Arial" pitchFamily="34" charset="0"/>
+              </a:rPr>
+              <a:t> </a:t>
+            </a:r>
+            <a:r>
+              <a:rPr kumimoji="0" lang="ru-RU" sz="1000" b="0" i="0" u="none" strike="noStrike" cap="none" normalizeH="0" baseline="0" smtClean="0">
+                <a:ln>
+                  <a:noFill/>
+                </a:ln>
+                <a:solidFill>
+                  <a:srgbClr val="75715E"/>
+                </a:solidFill>
+                <a:effectLst/>
+                <a:latin typeface="sfmono-regular"/>
+                <a:cs typeface="Arial" pitchFamily="34" charset="0"/>
+              </a:rPr>
+              <a:t>// true if the session doesn't contains a `foo` attribute </a:t>
+            </a:r>
+            <a:r>
+              <a:rPr kumimoji="0" lang="ru-RU" sz="1000" b="0" i="0" u="none" strike="noStrike" cap="none" normalizeH="0" baseline="0" smtClean="0">
+                <a:ln>
+                  <a:noFill/>
+                </a:ln>
+                <a:solidFill>
+                  <a:srgbClr val="F78557"/>
+                </a:solidFill>
+                <a:effectLst/>
+                <a:latin typeface="sfmono-regular"/>
+                <a:cs typeface="Arial" pitchFamily="34" charset="0"/>
+              </a:rPr>
+              <a:t>"#{foo.isUndefined()}"</a:t>
+            </a:r>
+            <a:r>
+              <a:rPr kumimoji="0" lang="ru-RU" sz="1000" b="0" i="0" u="none" strike="noStrike" cap="none" normalizeH="0" baseline="0" smtClean="0">
+                <a:ln>
+                  <a:noFill/>
+                </a:ln>
+                <a:solidFill>
+                  <a:srgbClr val="272822"/>
+                </a:solidFill>
+                <a:effectLst/>
+                <a:latin typeface="sfmono-regular"/>
+                <a:cs typeface="Arial" pitchFamily="34" charset="0"/>
+              </a:rPr>
+              <a:t> </a:t>
+            </a:r>
+            <a:r>
+              <a:rPr kumimoji="0" lang="ru-RU" sz="1000" b="0" i="0" u="none" strike="noStrike" cap="none" normalizeH="0" baseline="0" smtClean="0">
+                <a:ln>
+                  <a:noFill/>
+                </a:ln>
+                <a:solidFill>
+                  <a:srgbClr val="75715E"/>
+                </a:solidFill>
+                <a:effectLst/>
+                <a:latin typeface="sfmono-regular"/>
+                <a:cs typeface="Arial" pitchFamily="34" charset="0"/>
+              </a:rPr>
+              <a:t>// properly formats into a JSON value (wrap Strings with double quotes, deal with null) </a:t>
+            </a:r>
+            <a:r>
+              <a:rPr kumimoji="0" lang="ru-RU" sz="1000" b="0" i="0" u="none" strike="noStrike" cap="none" normalizeH="0" baseline="0" smtClean="0">
+                <a:ln>
+                  <a:noFill/>
+                </a:ln>
+                <a:solidFill>
+                  <a:srgbClr val="F78557"/>
+                </a:solidFill>
+                <a:effectLst/>
+                <a:latin typeface="sfmono-regular"/>
+                <a:cs typeface="Arial" pitchFamily="34" charset="0"/>
+              </a:rPr>
+              <a:t>"#{foo.jsonStringify()}"</a:t>
+            </a:r>
+            <a:r>
+              <a:rPr kumimoji="0" lang="ru-RU" sz="1000" b="0" i="0" u="none" strike="noStrike" cap="none" normalizeH="0" baseline="0" smtClean="0">
+                <a:ln>
+                  <a:noFill/>
+                </a:ln>
+                <a:solidFill>
+                  <a:srgbClr val="272822"/>
+                </a:solidFill>
+                <a:effectLst/>
+                <a:latin typeface="sfmono-regular"/>
+                <a:cs typeface="Arial" pitchFamily="34" charset="0"/>
+              </a:rPr>
+              <a:t> </a:t>
+            </a:r>
+            <a:r>
+              <a:rPr kumimoji="0" lang="ru-RU" sz="1000" b="0" i="0" u="none" strike="noStrike" cap="none" normalizeH="0" baseline="0" smtClean="0">
+                <a:ln>
+                  <a:noFill/>
+                </a:ln>
+                <a:solidFill>
+                  <a:srgbClr val="75715E"/>
+                </a:solidFill>
+                <a:effectLst/>
+                <a:latin typeface="sfmono-regular"/>
+                <a:cs typeface="Arial" pitchFamily="34" charset="0"/>
+              </a:rPr>
+              <a:t>// System.currentTimeMillis </a:t>
+            </a:r>
+            <a:r>
+              <a:rPr kumimoji="0" lang="ru-RU" sz="1000" b="0" i="0" u="none" strike="noStrike" cap="none" normalizeH="0" baseline="0" smtClean="0">
+                <a:ln>
+                  <a:noFill/>
+                </a:ln>
+                <a:solidFill>
+                  <a:srgbClr val="F78557"/>
+                </a:solidFill>
+                <a:effectLst/>
+                <a:latin typeface="sfmono-regular"/>
+                <a:cs typeface="Arial" pitchFamily="34" charset="0"/>
+              </a:rPr>
+              <a:t>"#{currentTimeMillis()}"</a:t>
+            </a:r>
+            <a:r>
+              <a:rPr kumimoji="0" lang="ru-RU" sz="1000" b="0" i="0" u="none" strike="noStrike" cap="none" normalizeH="0" baseline="0" smtClean="0">
+                <a:ln>
+                  <a:noFill/>
+                </a:ln>
+                <a:solidFill>
+                  <a:srgbClr val="272822"/>
+                </a:solidFill>
+                <a:effectLst/>
+                <a:latin typeface="sfmono-regular"/>
+                <a:cs typeface="Arial" pitchFamily="34" charset="0"/>
+              </a:rPr>
+              <a:t> </a:t>
+            </a:r>
+            <a:r>
+              <a:rPr kumimoji="0" lang="ru-RU" sz="1000" b="0" i="0" u="none" strike="noStrike" cap="none" normalizeH="0" baseline="0" smtClean="0">
+                <a:ln>
+                  <a:noFill/>
+                </a:ln>
+                <a:solidFill>
+                  <a:srgbClr val="75715E"/>
+                </a:solidFill>
+                <a:effectLst/>
+                <a:latin typeface="sfmono-regular"/>
+                <a:cs typeface="Arial" pitchFamily="34" charset="0"/>
+              </a:rPr>
+              <a:t>// ZonedDateTime.now() formatted with a java.time.format.DateTimeFormatter pattern </a:t>
+            </a:r>
+            <a:r>
+              <a:rPr kumimoji="0" lang="ru-RU" sz="1000" b="0" i="0" u="none" strike="noStrike" cap="none" normalizeH="0" baseline="0" smtClean="0">
+                <a:ln>
+                  <a:noFill/>
+                </a:ln>
+                <a:solidFill>
+                  <a:srgbClr val="F78557"/>
+                </a:solidFill>
+                <a:effectLst/>
+                <a:latin typeface="sfmono-regular"/>
+                <a:cs typeface="Arial" pitchFamily="34" charset="0"/>
+              </a:rPr>
+              <a:t>"#{currentDate(&lt;pattern&gt;)}"</a:t>
+            </a:r>
+            <a:r>
+              <a:rPr kumimoji="0" lang="ru-RU" sz="1000" b="0" i="0" u="none" strike="noStrike" cap="none" normalizeH="0" baseline="0" smtClean="0">
+                <a:ln>
+                  <a:noFill/>
+                </a:ln>
+                <a:solidFill>
+                  <a:srgbClr val="272822"/>
+                </a:solidFill>
+                <a:effectLst/>
+                <a:latin typeface="sfmono-regular"/>
+                <a:cs typeface="Arial" pitchFamily="34" charset="0"/>
+              </a:rPr>
+              <a:t> </a:t>
+            </a:r>
+            <a:r>
+              <a:rPr kumimoji="0" lang="ru-RU" sz="1000" b="0" i="0" u="none" strike="noStrike" cap="none" normalizeH="0" baseline="0" smtClean="0">
+                <a:ln>
+                  <a:noFill/>
+                </a:ln>
+                <a:solidFill>
+                  <a:srgbClr val="75715E"/>
+                </a:solidFill>
+                <a:effectLst/>
+                <a:latin typeface="sfmono-regular"/>
+                <a:cs typeface="Arial" pitchFamily="34" charset="0"/>
+              </a:rPr>
+              <a:t>// unescape an HTML String (entities decoded) </a:t>
+            </a:r>
+            <a:r>
+              <a:rPr kumimoji="0" lang="ru-RU" sz="1000" b="0" i="0" u="none" strike="noStrike" cap="none" normalizeH="0" baseline="0" smtClean="0">
+                <a:ln>
+                  <a:noFill/>
+                </a:ln>
+                <a:solidFill>
+                  <a:srgbClr val="F78557"/>
+                </a:solidFill>
+                <a:effectLst/>
+                <a:latin typeface="sfmono-regular"/>
+                <a:cs typeface="Arial" pitchFamily="34" charset="0"/>
+              </a:rPr>
+              <a:t>"#{foo.htmlUnescape()}"</a:t>
+            </a:r>
+            <a:r>
+              <a:rPr kumimoji="0" lang="ru-RU" sz="1000" b="0" i="0" u="none" strike="noStrike" cap="none" normalizeH="0" baseline="0" smtClean="0">
+                <a:ln>
+                  <a:noFill/>
+                </a:ln>
+                <a:solidFill>
+                  <a:srgbClr val="272822"/>
+                </a:solidFill>
+                <a:effectLst/>
+                <a:latin typeface="sfmono-regular"/>
+                <a:cs typeface="Arial" pitchFamily="34" charset="0"/>
+              </a:rPr>
+              <a:t> </a:t>
+            </a:r>
+            <a:r>
+              <a:rPr kumimoji="0" lang="ru-RU" sz="1000" b="0" i="0" u="none" strike="noStrike" cap="none" normalizeH="0" baseline="0" smtClean="0">
+                <a:ln>
+                  <a:noFill/>
+                </a:ln>
+                <a:solidFill>
+                  <a:srgbClr val="75715E"/>
+                </a:solidFill>
+                <a:effectLst/>
+                <a:latin typeface="sfmono-regular"/>
+                <a:cs typeface="Arial" pitchFamily="34" charset="0"/>
+              </a:rPr>
+              <a:t>// generate a random UUID String (fast but cryptographically insecure) </a:t>
+            </a:r>
+            <a:r>
+              <a:rPr kumimoji="0" lang="ru-RU" sz="1000" b="0" i="0" u="none" strike="noStrike" cap="none" normalizeH="0" baseline="0" smtClean="0">
+                <a:ln>
+                  <a:noFill/>
+                </a:ln>
+                <a:solidFill>
+                  <a:srgbClr val="F78557"/>
+                </a:solidFill>
+                <a:effectLst/>
+                <a:latin typeface="sfmono-regular"/>
+                <a:cs typeface="Arial" pitchFamily="34" charset="0"/>
+              </a:rPr>
+              <a:t>"#{randomUuid()}"</a:t>
+            </a:r>
+            <a:r>
+              <a:rPr kumimoji="0" lang="ru-RU" sz="1000" b="0" i="0" u="none" strike="noStrike" cap="none" normalizeH="0" baseline="0" smtClean="0">
+                <a:ln>
+                  <a:noFill/>
+                </a:ln>
+                <a:solidFill>
+                  <a:srgbClr val="272822"/>
+                </a:solidFill>
+                <a:effectLst/>
+                <a:latin typeface="sfmono-regular"/>
+                <a:cs typeface="Arial" pitchFamily="34" charset="0"/>
+              </a:rPr>
+              <a:t> </a:t>
+            </a:r>
+            <a:r>
+              <a:rPr kumimoji="0" lang="ru-RU" sz="1000" b="0" i="0" u="none" strike="noStrike" cap="none" normalizeH="0" baseline="0" smtClean="0">
+                <a:ln>
+                  <a:noFill/>
+                </a:ln>
+                <a:solidFill>
+                  <a:srgbClr val="75715E"/>
+                </a:solidFill>
+                <a:effectLst/>
+                <a:latin typeface="sfmono-regular"/>
+                <a:cs typeface="Arial" pitchFamily="34" charset="0"/>
+              </a:rPr>
+              <a:t>// generate a random UUID String (standard java.util.UUID#randomUUID: cryptographically secure, but slower) </a:t>
+            </a:r>
+            <a:r>
+              <a:rPr kumimoji="0" lang="ru-RU" sz="1000" b="0" i="0" u="none" strike="noStrike" cap="none" normalizeH="0" baseline="0" smtClean="0">
+                <a:ln>
+                  <a:noFill/>
+                </a:ln>
+                <a:solidFill>
+                  <a:srgbClr val="F78557"/>
+                </a:solidFill>
+                <a:effectLst/>
+                <a:latin typeface="sfmono-regular"/>
+                <a:cs typeface="Arial" pitchFamily="34" charset="0"/>
+              </a:rPr>
+              <a:t>"#{randomSecureUuid()}"</a:t>
+            </a:r>
+            <a:r>
+              <a:rPr kumimoji="0" lang="ru-RU" sz="1000" b="0" i="0" u="none" strike="noStrike" cap="none" normalizeH="0" baseline="0" smtClean="0">
+                <a:ln>
+                  <a:noFill/>
+                </a:ln>
+                <a:solidFill>
+                  <a:srgbClr val="272822"/>
+                </a:solidFill>
+                <a:effectLst/>
+                <a:latin typeface="sfmono-regular"/>
+                <a:cs typeface="Arial" pitchFamily="34" charset="0"/>
+              </a:rPr>
+              <a:t> </a:t>
+            </a:r>
+            <a:r>
+              <a:rPr kumimoji="0" lang="ru-RU" sz="1000" b="0" i="0" u="none" strike="noStrike" cap="none" normalizeH="0" baseline="0" smtClean="0">
+                <a:ln>
+                  <a:noFill/>
+                </a:ln>
+                <a:solidFill>
+                  <a:srgbClr val="75715E"/>
+                </a:solidFill>
+                <a:effectLst/>
+                <a:latin typeface="sfmono-regular"/>
+                <a:cs typeface="Arial" pitchFamily="34" charset="0"/>
+              </a:rPr>
+              <a:t>// generate a random Int with full range </a:t>
+            </a:r>
+            <a:r>
+              <a:rPr kumimoji="0" lang="ru-RU" sz="1000" b="0" i="0" u="none" strike="noStrike" cap="none" normalizeH="0" baseline="0" smtClean="0">
+                <a:ln>
+                  <a:noFill/>
+                </a:ln>
+                <a:solidFill>
+                  <a:srgbClr val="F78557"/>
+                </a:solidFill>
+                <a:effectLst/>
+                <a:latin typeface="sfmono-regular"/>
+                <a:cs typeface="Arial" pitchFamily="34" charset="0"/>
+              </a:rPr>
+              <a:t>"#{randomInt()}"</a:t>
+            </a:r>
+            <a:r>
+              <a:rPr kumimoji="0" lang="ru-RU" sz="1000" b="0" i="0" u="none" strike="noStrike" cap="none" normalizeH="0" baseline="0" smtClean="0">
+                <a:ln>
+                  <a:noFill/>
+                </a:ln>
+                <a:solidFill>
+                  <a:srgbClr val="272822"/>
+                </a:solidFill>
+                <a:effectLst/>
+                <a:latin typeface="sfmono-regular"/>
+                <a:cs typeface="Arial" pitchFamily="34" charset="0"/>
+              </a:rPr>
+              <a:t> </a:t>
+            </a:r>
+            <a:r>
+              <a:rPr kumimoji="0" lang="ru-RU" sz="1000" b="0" i="0" u="none" strike="noStrike" cap="none" normalizeH="0" baseline="0" smtClean="0">
+                <a:ln>
+                  <a:noFill/>
+                </a:ln>
+                <a:solidFill>
+                  <a:srgbClr val="75715E"/>
+                </a:solidFill>
+                <a:effectLst/>
+                <a:latin typeface="sfmono-regular"/>
+                <a:cs typeface="Arial" pitchFamily="34" charset="0"/>
+              </a:rPr>
+              <a:t>// generate a random Int, where the number generated is &gt;= 5 and &lt; 10 (the right bound of 10 is excluded) </a:t>
+            </a:r>
+            <a:r>
+              <a:rPr kumimoji="0" lang="ru-RU" sz="1000" b="0" i="0" u="none" strike="noStrike" cap="none" normalizeH="0" baseline="0" smtClean="0">
+                <a:ln>
+                  <a:noFill/>
+                </a:ln>
+                <a:solidFill>
+                  <a:srgbClr val="F78557"/>
+                </a:solidFill>
+                <a:effectLst/>
+                <a:latin typeface="sfmono-regular"/>
+                <a:cs typeface="Arial" pitchFamily="34" charset="0"/>
+              </a:rPr>
+              <a:t>"#{randomInt(5,10)}"</a:t>
+            </a:r>
+            <a:r>
+              <a:rPr kumimoji="0" lang="ru-RU" sz="1000" b="0" i="0" u="none" strike="noStrike" cap="none" normalizeH="0" baseline="0" smtClean="0">
+                <a:ln>
+                  <a:noFill/>
+                </a:ln>
+                <a:solidFill>
+                  <a:srgbClr val="272822"/>
+                </a:solidFill>
+                <a:effectLst/>
+                <a:latin typeface="sfmono-regular"/>
+                <a:cs typeface="Arial" pitchFamily="34" charset="0"/>
+              </a:rPr>
+              <a:t> </a:t>
+            </a:r>
+            <a:r>
+              <a:rPr kumimoji="0" lang="ru-RU" sz="1000" b="0" i="0" u="none" strike="noStrike" cap="none" normalizeH="0" baseline="0" smtClean="0">
+                <a:ln>
+                  <a:noFill/>
+                </a:ln>
+                <a:solidFill>
+                  <a:srgbClr val="75715E"/>
+                </a:solidFill>
+                <a:effectLst/>
+                <a:latin typeface="sfmono-regular"/>
+                <a:cs typeface="Arial" pitchFamily="34" charset="0"/>
+              </a:rPr>
+              <a:t>// generate a random Long with full range </a:t>
+            </a:r>
+            <a:r>
+              <a:rPr kumimoji="0" lang="ru-RU" sz="1000" b="0" i="0" u="none" strike="noStrike" cap="none" normalizeH="0" baseline="0" smtClean="0">
+                <a:ln>
+                  <a:noFill/>
+                </a:ln>
+                <a:solidFill>
+                  <a:srgbClr val="F78557"/>
+                </a:solidFill>
+                <a:effectLst/>
+                <a:latin typeface="sfmono-regular"/>
+                <a:cs typeface="Arial" pitchFamily="34" charset="0"/>
+              </a:rPr>
+              <a:t>"#{randomLong()}"</a:t>
+            </a:r>
+            <a:r>
+              <a:rPr kumimoji="0" lang="ru-RU" sz="1000" b="0" i="0" u="none" strike="noStrike" cap="none" normalizeH="0" baseline="0" smtClean="0">
+                <a:ln>
+                  <a:noFill/>
+                </a:ln>
+                <a:solidFill>
+                  <a:srgbClr val="272822"/>
+                </a:solidFill>
+                <a:effectLst/>
+                <a:latin typeface="sfmono-regular"/>
+                <a:cs typeface="Arial" pitchFamily="34" charset="0"/>
+              </a:rPr>
+              <a:t> </a:t>
+            </a:r>
+            <a:r>
+              <a:rPr kumimoji="0" lang="ru-RU" sz="1000" b="0" i="0" u="none" strike="noStrike" cap="none" normalizeH="0" baseline="0" smtClean="0">
+                <a:ln>
+                  <a:noFill/>
+                </a:ln>
+                <a:solidFill>
+                  <a:srgbClr val="75715E"/>
+                </a:solidFill>
+                <a:effectLst/>
+                <a:latin typeface="sfmono-regular"/>
+                <a:cs typeface="Arial" pitchFamily="34" charset="0"/>
+              </a:rPr>
+              <a:t>// generate a random Long, where the number generated is &gt;= 2147483648 and &lt; 2147483658 (the right bound is excluded) </a:t>
+            </a:r>
+            <a:r>
+              <a:rPr kumimoji="0" lang="ru-RU" sz="1000" b="0" i="0" u="none" strike="noStrike" cap="none" normalizeH="0" baseline="0" smtClean="0">
+                <a:ln>
+                  <a:noFill/>
+                </a:ln>
+                <a:solidFill>
+                  <a:srgbClr val="F78557"/>
+                </a:solidFill>
+                <a:effectLst/>
+                <a:latin typeface="sfmono-regular"/>
+                <a:cs typeface="Arial" pitchFamily="34" charset="0"/>
+              </a:rPr>
+              <a:t>"#{randomLong(2147483648,2147483658)}"</a:t>
+            </a:r>
+            <a:r>
+              <a:rPr kumimoji="0" lang="ru-RU" sz="1000" b="0" i="0" u="none" strike="noStrike" cap="none" normalizeH="0" baseline="0" smtClean="0">
+                <a:ln>
+                  <a:noFill/>
+                </a:ln>
+                <a:solidFill>
+                  <a:srgbClr val="272822"/>
+                </a:solidFill>
+                <a:effectLst/>
+                <a:latin typeface="sfmono-regular"/>
+                <a:cs typeface="Arial" pitchFamily="34" charset="0"/>
+              </a:rPr>
+              <a:t> </a:t>
+            </a:r>
+            <a:r>
+              <a:rPr kumimoji="0" lang="ru-RU" sz="1000" b="0" i="0" u="none" strike="noStrike" cap="none" normalizeH="0" baseline="0" smtClean="0">
+                <a:ln>
+                  <a:noFill/>
+                </a:ln>
+                <a:solidFill>
+                  <a:srgbClr val="75715E"/>
+                </a:solidFill>
+                <a:effectLst/>
+                <a:latin typeface="sfmono-regular"/>
+                <a:cs typeface="Arial" pitchFamily="34" charset="0"/>
+              </a:rPr>
+              <a:t>// The following functions generate a random Double value in a given range // To use these functions you must adhere to the following formats and pay attention to the gotchas // * a valid double string is of the format number.number, ex 0.34 or -12.34, while these are INVALID .34 or 2. or +0.34 // must be of the format -?\d+.\d+ (can start with a - then has digit(s) then a . then has digit(s)) // * when the double is converted to a string in the payload, // you may end up seeing doubles represented in scientific notation. // This can happen when you choose very small or very big numbers or when requesting many decimal places // generate a random Double, where the number generated is &gt;= -42.42 and &lt; 42.42 (the right bound of 42.42 is excluded) </a:t>
+            </a:r>
+            <a:r>
+              <a:rPr kumimoji="0" lang="ru-RU" sz="1000" b="0" i="0" u="none" strike="noStrike" cap="none" normalizeH="0" baseline="0" smtClean="0">
+                <a:ln>
+                  <a:noFill/>
+                </a:ln>
+                <a:solidFill>
+                  <a:srgbClr val="F78557"/>
+                </a:solidFill>
+                <a:effectLst/>
+                <a:latin typeface="sfmono-regular"/>
+                <a:cs typeface="Arial" pitchFamily="34" charset="0"/>
+              </a:rPr>
+              <a:t>"#{randomDouble(-42.42,42.42)}"</a:t>
+            </a:r>
+            <a:r>
+              <a:rPr kumimoji="0" lang="ru-RU" sz="1000" b="0" i="0" u="none" strike="noStrike" cap="none" normalizeH="0" baseline="0" smtClean="0">
+                <a:ln>
+                  <a:noFill/>
+                </a:ln>
+                <a:solidFill>
+                  <a:srgbClr val="272822"/>
+                </a:solidFill>
+                <a:effectLst/>
+                <a:latin typeface="sfmono-regular"/>
+                <a:cs typeface="Arial" pitchFamily="34" charset="0"/>
+              </a:rPr>
+              <a:t> </a:t>
+            </a:r>
+            <a:r>
+              <a:rPr kumimoji="0" lang="ru-RU" sz="1000" b="0" i="0" u="none" strike="noStrike" cap="none" normalizeH="0" baseline="0" smtClean="0">
+                <a:ln>
+                  <a:noFill/>
+                </a:ln>
+                <a:solidFill>
+                  <a:srgbClr val="75715E"/>
+                </a:solidFill>
+                <a:effectLst/>
+                <a:latin typeface="sfmono-regular"/>
+                <a:cs typeface="Arial" pitchFamily="34" charset="0"/>
+              </a:rPr>
+              <a:t>// generate a random Double, similar to above, but limit to max of 3 decimal places </a:t>
+            </a:r>
+            <a:r>
+              <a:rPr kumimoji="0" lang="ru-RU" sz="1000" b="0" i="0" u="none" strike="noStrike" cap="none" normalizeH="0" baseline="0" smtClean="0">
+                <a:ln>
+                  <a:noFill/>
+                </a:ln>
+                <a:solidFill>
+                  <a:srgbClr val="F78557"/>
+                </a:solidFill>
+                <a:effectLst/>
+                <a:latin typeface="sfmono-regular"/>
+                <a:cs typeface="Arial" pitchFamily="34" charset="0"/>
+              </a:rPr>
+              <a:t>"#{randomDouble(-42.42,42.42,3)}"</a:t>
+            </a:r>
+            <a:r>
+              <a:rPr kumimoji="0" lang="ru-RU" sz="1000" b="0" i="0" u="none" strike="noStrike" cap="none" normalizeH="0" baseline="0" smtClean="0">
+                <a:ln>
+                  <a:noFill/>
+                </a:ln>
+                <a:solidFill>
+                  <a:srgbClr val="272822"/>
+                </a:solidFill>
+                <a:effectLst/>
+                <a:latin typeface="sfmono-regular"/>
+                <a:cs typeface="Arial" pitchFamily="34" charset="0"/>
+              </a:rPr>
+              <a:t> </a:t>
+            </a:r>
+            <a:r>
+              <a:rPr kumimoji="0" lang="ru-RU" sz="1000" b="0" i="0" u="none" strike="noStrike" cap="none" normalizeH="0" baseline="0" smtClean="0">
+                <a:ln>
+                  <a:noFill/>
+                </a:ln>
+                <a:solidFill>
+                  <a:srgbClr val="75715E"/>
+                </a:solidFill>
+                <a:effectLst/>
+                <a:latin typeface="sfmono-regular"/>
+                <a:cs typeface="Arial" pitchFamily="34" charset="0"/>
+              </a:rPr>
+              <a:t>// generate a random alphanumeric with length </a:t>
+            </a:r>
+            <a:r>
+              <a:rPr kumimoji="0" lang="ru-RU" sz="1000" b="0" i="0" u="none" strike="noStrike" cap="none" normalizeH="0" baseline="0" smtClean="0">
+                <a:ln>
+                  <a:noFill/>
+                </a:ln>
+                <a:solidFill>
+                  <a:srgbClr val="F78557"/>
+                </a:solidFill>
+                <a:effectLst/>
+                <a:latin typeface="sfmono-regular"/>
+                <a:cs typeface="Arial" pitchFamily="34" charset="0"/>
+              </a:rPr>
+              <a:t>"#{randomAlphanumeric(10)}"</a:t>
+            </a:r>
+            <a:r>
+              <a:rPr kumimoji="0" lang="ru-RU" sz="600" b="0" i="0" u="none" strike="noStrike" cap="none" normalizeH="0" baseline="0" smtClean="0">
+                <a:ln>
+                  <a:noFill/>
+                </a:ln>
+                <a:solidFill>
+                  <a:schemeClr val="tx1"/>
+                </a:solidFill>
+                <a:effectLst/>
+                <a:latin typeface="Arial" pitchFamily="34" charset="0"/>
+                <a:cs typeface="Arial" pitchFamily="34" charset="0"/>
+              </a:rPr>
+              <a:t> </a:t>
+            </a:r>
+            <a:endParaRPr kumimoji="0" lang="ru-RU" sz="1800" b="0" i="0" u="none" strike="noStrike" cap="none" normalizeH="0" baseline="0" smtClean="0">
+              <a:ln>
+                <a:noFill/>
+              </a:ln>
+              <a:solidFill>
+                <a:schemeClr val="tx1"/>
+              </a:solidFill>
+              <a:effectLst/>
+              <a:latin typeface="Arial" pitchFamily="34" charset="0"/>
+              <a:cs typeface="Arial" pitchFamily="34" charset="0"/>
+            </a:endParaRPr>
+          </a:p>
+        </p:txBody>
+      </p:sp>
+    </p:spTree>
+  </p:cSld>
+  <p:clrMapOvr>
+    <a:masterClrMapping/>
+  </p:clrMapOvr>
+</p:sld>
+</file>
+
+<file path=ppt/slides/slide8.xml><?xml version="1.0" encoding="utf-8"?>
+<p:sld xmlns:a="http://schemas.openxmlformats.org/drawingml/2006/main" xmlns:r="http://schemas.openxmlformats.org/officeDocument/2006/relationships" xmlns:p="http://schemas.openxmlformats.org/presentationml/2006/main">
+  <p:cSld>
+    <p:bg>
+      <p:bgPr>
+        <a:noFill/>
+        <a:effectLst/>
+      </p:bgPr>
+    </p:bg>
+    <p:spTree>
+      <p:nvGrpSpPr>
+        <p:cNvPr id="1" name=""/>
+        <p:cNvGrpSpPr/>
+        <p:nvPr/>
+      </p:nvGrpSpPr>
+      <p:grpSpPr>
+        <a:xfrm>
+          <a:off x="0" y="0"/>
+          <a:ext cx="0" cy="0"/>
+          <a:chOff x="0" y="0"/>
+          <a:chExt cx="0" cy="0"/>
+        </a:xfrm>
+      </p:grpSpPr>
+      <p:sp>
+        <p:nvSpPr>
+          <p:cNvPr id="2" name="Заголовок 1"/>
+          <p:cNvSpPr>
+            <a:spLocks noGrp="1"/>
+          </p:cNvSpPr>
+          <p:nvPr>
+            <p:ph type="title"/>
+          </p:nvPr>
+        </p:nvSpPr>
+        <p:spPr/>
+        <p:txBody>
+          <a:bodyPr/>
+          <a:lstStyle/>
+          <a:p>
+            <a:r>
+              <a:rPr lang="ru-RU" dirty="0" smtClean="0"/>
+              <a:t>Встроенные функции</a:t>
+            </a:r>
+            <a:endParaRPr lang="ru-RU" dirty="0"/>
+          </a:p>
+        </p:txBody>
+      </p:sp>
+      <p:sp>
+        <p:nvSpPr>
+          <p:cNvPr id="4" name="TextBox 3"/>
+          <p:cNvSpPr txBox="1"/>
+          <p:nvPr/>
+        </p:nvSpPr>
+        <p:spPr>
+          <a:xfrm>
+            <a:off x="571472" y="1214422"/>
+            <a:ext cx="7737503" cy="646331"/>
+          </a:xfrm>
+          <a:prstGeom prst="rect">
+            <a:avLst/>
+          </a:prstGeom>
+          <a:noFill/>
+        </p:spPr>
+        <p:txBody>
+          <a:bodyPr wrap="none" rtlCol="0">
+            <a:spAutoFit/>
+          </a:bodyPr>
+          <a:lstStyle/>
+          <a:p>
+            <a:r>
+              <a:rPr lang="en-US" dirty="0" smtClean="0">
+                <a:hlinkClick r:id="rId2"/>
+              </a:rPr>
+              <a:t>https://gatling.io/docs/gatling/reference/current/core/session/el/#</a:t>
+            </a:r>
+            <a:r>
+              <a:rPr lang="en-US" dirty="0" smtClean="0">
+                <a:hlinkClick r:id="rId2"/>
+              </a:rPr>
+              <a:t>built-in-functions</a:t>
+            </a:r>
+            <a:endParaRPr lang="ru-RU" dirty="0" smtClean="0"/>
+          </a:p>
+          <a:p>
+            <a:endParaRPr lang="ru-RU" dirty="0"/>
+          </a:p>
+        </p:txBody>
+      </p:sp>
+      <p:sp>
+        <p:nvSpPr>
+          <p:cNvPr id="7" name="TextBox 6"/>
+          <p:cNvSpPr txBox="1"/>
+          <p:nvPr/>
+        </p:nvSpPr>
+        <p:spPr>
+          <a:xfrm>
+            <a:off x="571472" y="1643050"/>
+            <a:ext cx="4286280" cy="4832092"/>
+          </a:xfrm>
+          <a:prstGeom prst="rect">
+            <a:avLst/>
+          </a:prstGeom>
+          <a:noFill/>
+        </p:spPr>
+        <p:txBody>
+          <a:bodyPr wrap="square" rtlCol="0">
+            <a:spAutoFit/>
+          </a:bodyPr>
+          <a:lstStyle/>
+          <a:p>
+            <a:r>
+              <a:rPr lang="ru-RU" dirty="0" smtClean="0"/>
+              <a:t>Функции доступные в </a:t>
+            </a:r>
+            <a:r>
+              <a:rPr lang="en-US" dirty="0" smtClean="0"/>
+              <a:t>Gatling 3.9.5:</a:t>
+            </a:r>
+            <a:br>
+              <a:rPr lang="en-US" dirty="0" smtClean="0"/>
+            </a:br>
+            <a:endParaRPr lang="en-US" dirty="0" smtClean="0"/>
+          </a:p>
+          <a:p>
+            <a:r>
+              <a:rPr lang="en-US" sz="1600" dirty="0" smtClean="0"/>
+              <a:t>#{</a:t>
+            </a:r>
+            <a:r>
+              <a:rPr lang="en-US" sz="1600" dirty="0" err="1" smtClean="0"/>
+              <a:t>currentTimeMillis</a:t>
+            </a:r>
+            <a:r>
+              <a:rPr lang="en-US" sz="1600" dirty="0" smtClean="0"/>
+              <a:t>()}</a:t>
+            </a:r>
+          </a:p>
+          <a:p>
+            <a:r>
+              <a:rPr lang="en-US" sz="1600" dirty="0" smtClean="0"/>
+              <a:t>#{</a:t>
+            </a:r>
+            <a:r>
+              <a:rPr lang="en-US" sz="1600" dirty="0" err="1" smtClean="0"/>
+              <a:t>currentDate</a:t>
+            </a:r>
+            <a:r>
+              <a:rPr lang="en-US" sz="1600" dirty="0" smtClean="0"/>
+              <a:t>(&lt;pattern&gt;)}</a:t>
+            </a:r>
+          </a:p>
+          <a:p>
+            <a:r>
+              <a:rPr lang="en-US" sz="1600" dirty="0" smtClean="0"/>
+              <a:t>#{</a:t>
+            </a:r>
+            <a:r>
+              <a:rPr lang="en-US" sz="1600" dirty="0" err="1" smtClean="0"/>
+              <a:t>foo.htmlUnescape</a:t>
+            </a:r>
+            <a:r>
+              <a:rPr lang="en-US" sz="1600" dirty="0" smtClean="0"/>
+              <a:t>()}</a:t>
+            </a:r>
+          </a:p>
+          <a:p>
+            <a:r>
+              <a:rPr lang="en-US" sz="1600" dirty="0" smtClean="0"/>
+              <a:t>#{</a:t>
+            </a:r>
+            <a:r>
+              <a:rPr lang="en-US" sz="1600" dirty="0" err="1" smtClean="0"/>
+              <a:t>randomUuid</a:t>
+            </a:r>
+            <a:r>
+              <a:rPr lang="en-US" sz="1600" dirty="0" smtClean="0"/>
+              <a:t>()}</a:t>
+            </a:r>
+          </a:p>
+          <a:p>
+            <a:r>
+              <a:rPr lang="en-US" sz="1600" dirty="0" smtClean="0"/>
+              <a:t>#{</a:t>
+            </a:r>
+            <a:r>
+              <a:rPr lang="en-US" sz="1600" dirty="0" err="1" smtClean="0"/>
+              <a:t>randomSecureUuid</a:t>
+            </a:r>
+            <a:r>
+              <a:rPr lang="en-US" sz="1600" dirty="0" smtClean="0"/>
+              <a:t>()}</a:t>
+            </a:r>
+          </a:p>
+          <a:p>
+            <a:r>
+              <a:rPr lang="en-US" sz="1600" dirty="0" smtClean="0"/>
+              <a:t>#{</a:t>
+            </a:r>
+            <a:r>
+              <a:rPr lang="en-US" sz="1600" dirty="0" err="1" smtClean="0"/>
+              <a:t>randomInt</a:t>
+            </a:r>
+            <a:r>
+              <a:rPr lang="en-US" sz="1600" dirty="0" smtClean="0"/>
+              <a:t>()}</a:t>
+            </a:r>
+          </a:p>
+          <a:p>
+            <a:r>
+              <a:rPr lang="en-US" sz="1600" dirty="0" smtClean="0"/>
+              <a:t>#{</a:t>
+            </a:r>
+            <a:r>
+              <a:rPr lang="en-US" sz="1600" dirty="0" err="1" smtClean="0"/>
+              <a:t>randomInt</a:t>
+            </a:r>
+            <a:r>
+              <a:rPr lang="en-US" sz="1600" dirty="0" smtClean="0"/>
+              <a:t>(5,10)}</a:t>
+            </a:r>
+          </a:p>
+          <a:p>
+            <a:r>
+              <a:rPr lang="en-US" sz="1600" dirty="0" smtClean="0"/>
+              <a:t>#{</a:t>
+            </a:r>
+            <a:r>
+              <a:rPr lang="en-US" sz="1600" dirty="0" err="1" smtClean="0"/>
+              <a:t>randomLong</a:t>
+            </a:r>
+            <a:r>
+              <a:rPr lang="en-US" sz="1600" dirty="0" smtClean="0"/>
+              <a:t>()}</a:t>
+            </a:r>
+          </a:p>
+          <a:p>
+            <a:r>
+              <a:rPr lang="en-US" sz="1600" dirty="0" smtClean="0"/>
+              <a:t>#{</a:t>
+            </a:r>
+            <a:r>
+              <a:rPr lang="en-US" sz="1600" dirty="0" err="1" smtClean="0"/>
+              <a:t>randomLong</a:t>
+            </a:r>
+            <a:r>
+              <a:rPr lang="en-US" sz="1600" dirty="0" smtClean="0"/>
+              <a:t>(2147483648,2147483658)}</a:t>
+            </a:r>
+          </a:p>
+          <a:p>
+            <a:r>
+              <a:rPr lang="en-US" sz="1600" dirty="0" smtClean="0"/>
+              <a:t>#{</a:t>
+            </a:r>
+            <a:r>
+              <a:rPr lang="en-US" sz="1600" dirty="0" err="1" smtClean="0"/>
+              <a:t>randomDouble</a:t>
+            </a:r>
+            <a:r>
+              <a:rPr lang="en-US" sz="1600" dirty="0" smtClean="0"/>
+              <a:t>(-42.42,42.42)}</a:t>
+            </a:r>
+          </a:p>
+          <a:p>
+            <a:r>
+              <a:rPr lang="en-US" sz="1600" dirty="0" smtClean="0"/>
+              <a:t>#{</a:t>
+            </a:r>
+            <a:r>
+              <a:rPr lang="en-US" sz="1600" dirty="0" err="1" smtClean="0"/>
+              <a:t>randomDouble</a:t>
+            </a:r>
+            <a:r>
+              <a:rPr lang="en-US" sz="1600" dirty="0" smtClean="0"/>
+              <a:t>(-42.42,42.42,3)}</a:t>
+            </a:r>
+          </a:p>
+          <a:p>
+            <a:r>
+              <a:rPr lang="en-US" sz="1600" dirty="0" smtClean="0"/>
+              <a:t>#{</a:t>
+            </a:r>
+            <a:r>
+              <a:rPr lang="en-US" sz="1600" dirty="0" err="1" smtClean="0"/>
+              <a:t>randomAlphanumeric</a:t>
+            </a:r>
+            <a:r>
+              <a:rPr lang="en-US" sz="1600" dirty="0" smtClean="0"/>
+              <a:t>(10)}</a:t>
+            </a:r>
+          </a:p>
+          <a:p>
+            <a:r>
+              <a:rPr lang="en-US" sz="1600" dirty="0" smtClean="0"/>
+              <a:t>#{</a:t>
+            </a:r>
+            <a:r>
+              <a:rPr lang="en-US" sz="1600" dirty="0" err="1" smtClean="0"/>
+              <a:t>foo.size</a:t>
+            </a:r>
+            <a:r>
+              <a:rPr lang="en-US" sz="1600" dirty="0" smtClean="0"/>
+              <a:t>()}</a:t>
+            </a:r>
+          </a:p>
+          <a:p>
+            <a:r>
+              <a:rPr lang="en-US" sz="1600" dirty="0" smtClean="0"/>
+              <a:t>#{</a:t>
+            </a:r>
+            <a:r>
+              <a:rPr lang="en-US" sz="1600" dirty="0" err="1" smtClean="0"/>
+              <a:t>foo.random</a:t>
+            </a:r>
+            <a:r>
+              <a:rPr lang="en-US" sz="1600" dirty="0" smtClean="0"/>
+              <a:t>()}</a:t>
+            </a:r>
+          </a:p>
+          <a:p>
+            <a:r>
+              <a:rPr lang="en-US" sz="1600" dirty="0" smtClean="0"/>
+              <a:t>#{</a:t>
+            </a:r>
+            <a:r>
+              <a:rPr lang="en-US" sz="1600" dirty="0" err="1" smtClean="0"/>
+              <a:t>foo.exists</a:t>
+            </a:r>
+            <a:r>
+              <a:rPr lang="en-US" sz="1600" dirty="0" smtClean="0"/>
+              <a:t>()}</a:t>
+            </a:r>
+          </a:p>
+          <a:p>
+            <a:r>
+              <a:rPr lang="en-US" sz="1600" dirty="0" smtClean="0"/>
+              <a:t>#{</a:t>
+            </a:r>
+            <a:r>
+              <a:rPr lang="en-US" sz="1600" dirty="0" err="1" smtClean="0"/>
+              <a:t>foo.isUndefined</a:t>
+            </a:r>
+            <a:r>
+              <a:rPr lang="en-US" sz="1600" dirty="0" smtClean="0"/>
+              <a:t>()}</a:t>
+            </a:r>
+          </a:p>
+          <a:p>
+            <a:r>
+              <a:rPr lang="en-US" sz="1600" dirty="0" smtClean="0"/>
+              <a:t>#{</a:t>
+            </a:r>
+            <a:r>
+              <a:rPr lang="en-US" sz="1600" dirty="0" err="1" smtClean="0"/>
+              <a:t>foo.jsonStringify</a:t>
+            </a:r>
+            <a:r>
+              <a:rPr lang="en-US" sz="1600" dirty="0" smtClean="0"/>
+              <a:t>()}</a:t>
+            </a:r>
+            <a:endParaRPr lang="en-US" dirty="0" smtClean="0"/>
+          </a:p>
+        </p:txBody>
+      </p:sp>
+      <p:sp>
+        <p:nvSpPr>
+          <p:cNvPr id="8" name="TextBox 7"/>
+          <p:cNvSpPr txBox="1"/>
+          <p:nvPr/>
+        </p:nvSpPr>
+        <p:spPr>
+          <a:xfrm>
+            <a:off x="5214942" y="1643050"/>
+            <a:ext cx="4286280" cy="369332"/>
+          </a:xfrm>
+          <a:prstGeom prst="rect">
+            <a:avLst/>
+          </a:prstGeom>
+          <a:noFill/>
+        </p:spPr>
+        <p:txBody>
+          <a:bodyPr wrap="square" rtlCol="0">
+            <a:spAutoFit/>
+          </a:bodyPr>
+          <a:lstStyle/>
+          <a:p>
+            <a:r>
+              <a:rPr lang="ru-RU" dirty="0" smtClean="0"/>
+              <a:t>Удобно использовать:</a:t>
+            </a:r>
+            <a:endParaRPr lang="en-US" dirty="0" smtClean="0"/>
+          </a:p>
+        </p:txBody>
+      </p:sp>
+      <p:pic>
+        <p:nvPicPr>
+          <p:cNvPr id="21507" name="Picture 3"/>
+          <p:cNvPicPr>
+            <a:picLocks noChangeAspect="1" noChangeArrowheads="1"/>
+          </p:cNvPicPr>
+          <p:nvPr/>
+        </p:nvPicPr>
+        <p:blipFill>
+          <a:blip r:embed="rId3"/>
+          <a:srcRect/>
+          <a:stretch>
+            <a:fillRect/>
+          </a:stretch>
+        </p:blipFill>
+        <p:spPr bwMode="auto">
+          <a:xfrm>
+            <a:off x="5143504" y="2071678"/>
+            <a:ext cx="3562350" cy="2305050"/>
+          </a:xfrm>
+          <a:prstGeom prst="rect">
+            <a:avLst/>
+          </a:prstGeom>
+          <a:noFill/>
+          <a:ln w="9525">
+            <a:noFill/>
+            <a:miter lim="800000"/>
+            <a:headEnd/>
+            <a:tailEnd/>
+          </a:ln>
+          <a:effectLst/>
+        </p:spPr>
+      </p:pic>
+    </p:spTree>
+  </p:cSld>
+  <p:clrMapOvr>
+    <a:masterClrMapping/>
+  </p:clrMapOvr>
+</p:sld>
+</file>
+
+<file path=ppt/slides/slide9.xml><?xml version="1.0" encoding="utf-8"?>
 <p:sld xmlns:a="http://schemas.openxmlformats.org/drawingml/2006/main" xmlns:r="http://schemas.openxmlformats.org/officeDocument/2006/relationships" xmlns:p="http://schemas.openxmlformats.org/presentationml/2006/main">
   <p:cSld>
     <p:spTree>

</xml_diff>